<commit_message>
L4 in class demo
</commit_message>
<xml_diff>
--- a/L4/L4.pptx
+++ b/L4/L4.pptx
@@ -9525,7 +9525,15 @@
           <a:p>
             <a:r>
               <a:rPr lang="en-US" dirty="0"/>
-              <a:t>   if (a==b) {return true}</a:t>
+              <a:t>   if </a:t>
+            </a:r>
+            <a:r>
+              <a:rPr lang="en-US"/>
+              <a:t>(a!=</a:t>
+            </a:r>
+            <a:r>
+              <a:rPr lang="en-US" dirty="0"/>
+              <a:t>b) {return true}</a:t>
             </a:r>
           </a:p>
           <a:p>

</xml_diff>